<commit_message>
Top part with pulley modelled
</commit_message>
<xml_diff>
--- a/_kontroly_GVU/2023_11_16/Zavrel_GVU_2023_11_16.pptx
+++ b/_kontroly_GVU/2023_11_16/Zavrel_GVU_2023_11_16.pptx
@@ -8,21 +8,22 @@
     <p:sldId id="256" r:id="rId5"/>
     <p:sldId id="287" r:id="rId6"/>
     <p:sldId id="288" r:id="rId7"/>
-    <p:sldId id="286" r:id="rId8"/>
+    <p:sldId id="289" r:id="rId8"/>
+    <p:sldId id="286" r:id="rId9"/>
   </p:sldIdLst>
   <p:sldSz cx="9144000" cy="6858000" type="screen4x3"/>
   <p:notesSz cx="6858000" cy="9144000"/>
   <p:embeddedFontLst>
     <p:embeddedFont>
-      <p:font typeface="Technika" panose="00000500000000000000" pitchFamily="2" charset="-18"/>
-      <p:regular r:id="rId9"/>
-      <p:bold r:id="rId10"/>
-      <p:italic r:id="rId11"/>
-      <p:boldItalic r:id="rId12"/>
+      <p:font typeface="Technika" panose="020B0604020202020204" charset="-18"/>
+      <p:regular r:id="rId10"/>
+      <p:bold r:id="rId11"/>
+      <p:italic r:id="rId12"/>
+      <p:boldItalic r:id="rId13"/>
     </p:embeddedFont>
     <p:embeddedFont>
       <p:font typeface="Technika-Bold" panose="00000600000000000000" charset="-18"/>
-      <p:regular r:id="rId13"/>
+      <p:regular r:id="rId14"/>
     </p:embeddedFont>
   </p:embeddedFontLst>
   <p:defaultTextStyle>
@@ -2039,7 +2040,7 @@
             </a:pPr>
             <a:r>
               <a:rPr lang="cs-CZ" sz="1400" dirty="0"/>
-              <a:t>Plánován i jednoduchý experiment modelované struktury.</a:t>
+              <a:t>Plánován  experiment modelované struktury.</a:t>
             </a:r>
           </a:p>
           <a:p>
@@ -2111,7 +2112,10 @@
             <a:endParaRPr lang="cs-CZ" sz="1400" dirty="0"/>
           </a:p>
           <a:p>
-            <a:endParaRPr lang="cs-CZ" sz="1400" dirty="0"/>
+            <a:r>
+              <a:rPr lang="cs-CZ" sz="1400" dirty="0"/>
+              <a:t>=&gt; změna z důvodu větší shody obsahu s plánovanou publikací</a:t>
+            </a:r>
           </a:p>
           <a:p>
             <a:endParaRPr lang="cs-CZ" sz="1400" dirty="0"/>
@@ -2158,7 +2162,7 @@
         </p:blipFill>
         <p:spPr>
           <a:xfrm>
-            <a:off x="5664071" y="5022954"/>
+            <a:off x="6125710" y="5005199"/>
             <a:ext cx="1015989" cy="1453729"/>
           </a:xfrm>
           <a:prstGeom prst="rect">
@@ -2333,7 +2337,7 @@
         <p:spPr>
           <a:xfrm>
             <a:off x="184733" y="1326776"/>
-            <a:ext cx="8836397" cy="307777"/>
+            <a:ext cx="8836397" cy="3754874"/>
           </a:xfrm>
           <a:prstGeom prst="rect">
             <a:avLst/>
@@ -2352,7 +2356,7 @@
             </a:pPr>
             <a:r>
               <a:rPr lang="cs-CZ" sz="1400" dirty="0"/>
-              <a:t>Vytvořen jednoduchý model rotační </a:t>
+              <a:t>Vytvořen simulační model rotační </a:t>
             </a:r>
             <a:r>
               <a:rPr lang="cs-CZ" sz="1400" dirty="0" err="1"/>
@@ -2361,6 +2365,169 @@
             <a:r>
               <a:rPr lang="cs-CZ" sz="1400" dirty="0"/>
               <a:t> rotační vazby</a:t>
+            </a:r>
+          </a:p>
+          <a:p>
+            <a:pPr marL="285750" indent="-285750">
+              <a:buFont typeface="Arial" panose="020B0604020202020204" pitchFamily="34" charset="0"/>
+              <a:buChar char="•"/>
+            </a:pPr>
+            <a:r>
+              <a:rPr lang="cs-CZ" sz="1400" dirty="0"/>
+              <a:t>Experimentální model v přípravě</a:t>
+            </a:r>
+          </a:p>
+          <a:p>
+            <a:pPr marL="285750" indent="-285750">
+              <a:buFont typeface="Arial" panose="020B0604020202020204" pitchFamily="34" charset="0"/>
+              <a:buChar char="•"/>
+            </a:pPr>
+            <a:r>
+              <a:rPr lang="cs-CZ" sz="1400" dirty="0"/>
+              <a:t>Vytvořena optimalizační úloha na rozmístění připevnění lan z hlediska tuhosti a pohyblivosti</a:t>
+            </a:r>
+          </a:p>
+          <a:p>
+            <a:pPr marL="285750" indent="-285750">
+              <a:buFont typeface="Arial" panose="020B0604020202020204" pitchFamily="34" charset="0"/>
+              <a:buChar char="•"/>
+            </a:pPr>
+            <a:r>
+              <a:rPr lang="cs-CZ" sz="1400" dirty="0"/>
+              <a:t>Vytvořena optimalizační úloha z hlediska rozměrů tak, aby při pohonu byla dodržena konstantní délka lana</a:t>
+            </a:r>
+          </a:p>
+          <a:p>
+            <a:pPr marL="285750" indent="-285750">
+              <a:buFont typeface="Arial" panose="020B0604020202020204" pitchFamily="34" charset="0"/>
+              <a:buChar char="•"/>
+            </a:pPr>
+            <a:endParaRPr lang="cs-CZ" sz="1400" dirty="0"/>
+          </a:p>
+          <a:p>
+            <a:pPr marL="285750" indent="-285750">
+              <a:buFont typeface="Arial" panose="020B0604020202020204" pitchFamily="34" charset="0"/>
+              <a:buChar char="•"/>
+            </a:pPr>
+            <a:r>
+              <a:rPr lang="cs-CZ" sz="1400" dirty="0"/>
+              <a:t>Vytvořen simulační model 2-stage 3D </a:t>
+            </a:r>
+            <a:r>
+              <a:rPr lang="cs-CZ" sz="1400" dirty="0" err="1"/>
+              <a:t>tensegritické</a:t>
+            </a:r>
+            <a:r>
+              <a:rPr lang="cs-CZ" sz="1400" dirty="0"/>
+              <a:t> struktury se zahrnutím dynamiky (možnost získat tuhost koncového efektoru po jeho zatížení silou a </a:t>
+            </a:r>
+            <a:r>
+              <a:rPr lang="cs-CZ" sz="1400" dirty="0" err="1"/>
+              <a:t>vl</a:t>
+            </a:r>
+            <a:r>
+              <a:rPr lang="cs-CZ" sz="1400" dirty="0"/>
+              <a:t>. frekvencí a tvarů)</a:t>
+            </a:r>
+          </a:p>
+          <a:p>
+            <a:pPr marL="285750" indent="-285750">
+              <a:buFont typeface="Arial" panose="020B0604020202020204" pitchFamily="34" charset="0"/>
+              <a:buChar char="•"/>
+            </a:pPr>
+            <a:r>
+              <a:rPr lang="cs-CZ" sz="1400" dirty="0"/>
+              <a:t>Příprava inverzní dynamické úlohy </a:t>
+            </a:r>
+          </a:p>
+          <a:p>
+            <a:pPr marL="285750" indent="-285750">
+              <a:buFont typeface="Arial" panose="020B0604020202020204" pitchFamily="34" charset="0"/>
+              <a:buChar char="•"/>
+            </a:pPr>
+            <a:r>
+              <a:rPr lang="cs-CZ" sz="1400" dirty="0"/>
+              <a:t>Tvorba sériové struktury robota v přípravě (podobnost vzniklé </a:t>
+            </a:r>
+            <a:r>
+              <a:rPr lang="cs-CZ" sz="1400" dirty="0" err="1"/>
+              <a:t>tensegritě</a:t>
+            </a:r>
+            <a:r>
+              <a:rPr lang="cs-CZ" sz="1400" dirty="0"/>
+              <a:t>)</a:t>
+            </a:r>
+          </a:p>
+          <a:p>
+            <a:pPr marL="285750" indent="-285750">
+              <a:buFont typeface="Arial" panose="020B0604020202020204" pitchFamily="34" charset="0"/>
+              <a:buChar char="•"/>
+            </a:pPr>
+            <a:endParaRPr lang="cs-CZ" sz="1400" dirty="0"/>
+          </a:p>
+          <a:p>
+            <a:pPr marL="285750" indent="-285750">
+              <a:buFont typeface="Arial" panose="020B0604020202020204" pitchFamily="34" charset="0"/>
+              <a:buChar char="•"/>
+            </a:pPr>
+            <a:r>
+              <a:rPr lang="cs-CZ" sz="1400" dirty="0"/>
+              <a:t>Vytvořen 3D experiment 2-stage </a:t>
+            </a:r>
+            <a:r>
+              <a:rPr lang="cs-CZ" sz="1400" dirty="0" err="1"/>
+              <a:t>tensegritické</a:t>
+            </a:r>
+            <a:r>
+              <a:rPr lang="cs-CZ" sz="1400" dirty="0"/>
+              <a:t> struktury</a:t>
+            </a:r>
+          </a:p>
+          <a:p>
+            <a:pPr marL="285750" indent="-285750">
+              <a:buFont typeface="Arial" panose="020B0604020202020204" pitchFamily="34" charset="0"/>
+              <a:buChar char="•"/>
+            </a:pPr>
+            <a:r>
+              <a:rPr lang="cs-CZ" sz="1400" dirty="0"/>
+              <a:t>Téměř vytvořen experimentální model 3D kloubu s pohonem lana pomocí servomotoru</a:t>
+            </a:r>
+          </a:p>
+          <a:p>
+            <a:pPr marL="285750" indent="-285750">
+              <a:buFont typeface="Arial" panose="020B0604020202020204" pitchFamily="34" charset="0"/>
+              <a:buChar char="•"/>
+            </a:pPr>
+            <a:r>
+              <a:rPr lang="cs-CZ" sz="1400" dirty="0"/>
+              <a:t>Příprava 3D experimentu modelu sériového robota s klasickými kinematickými vazbami</a:t>
+            </a:r>
+          </a:p>
+          <a:p>
+            <a:pPr marL="285750" indent="-285750">
+              <a:buFont typeface="Arial" panose="020B0604020202020204" pitchFamily="34" charset="0"/>
+              <a:buChar char="•"/>
+            </a:pPr>
+            <a:endParaRPr lang="cs-CZ" sz="1400" dirty="0"/>
+          </a:p>
+          <a:p>
+            <a:pPr marL="285750" indent="-285750">
+              <a:buFont typeface="Arial" panose="020B0604020202020204" pitchFamily="34" charset="0"/>
+              <a:buChar char="•"/>
+            </a:pPr>
+            <a:r>
+              <a:rPr lang="cs-CZ" sz="1400" dirty="0"/>
+              <a:t>Probíhá tvorba rešeršní části publikace</a:t>
+            </a:r>
+          </a:p>
+          <a:p>
+            <a:pPr marL="285750" indent="-285750">
+              <a:buFont typeface="Arial" panose="020B0604020202020204" pitchFamily="34" charset="0"/>
+              <a:buChar char="•"/>
+            </a:pPr>
+            <a:r>
+              <a:rPr lang="cs-CZ" sz="1400" dirty="0"/>
+              <a:t>Příprava výstupních dat simulací do publikace</a:t>
             </a:r>
           </a:p>
         </p:txBody>
@@ -2379,6 +2546,444 @@
 </file>
 
 <file path=ppt/slides/slide4.xml><?xml version="1.0" encoding="utf-8"?>
+<p:sld xmlns:a="http://schemas.openxmlformats.org/drawingml/2006/main" xmlns:r="http://schemas.openxmlformats.org/officeDocument/2006/relationships" xmlns:p="http://schemas.openxmlformats.org/presentationml/2006/main">
+  <p:cSld>
+    <p:spTree>
+      <p:nvGrpSpPr>
+        <p:cNvPr id="1" name=""/>
+        <p:cNvGrpSpPr/>
+        <p:nvPr/>
+      </p:nvGrpSpPr>
+      <p:grpSpPr>
+        <a:xfrm>
+          <a:off x="0" y="0"/>
+          <a:ext cx="0" cy="0"/>
+          <a:chOff x="0" y="0"/>
+          <a:chExt cx="0" cy="0"/>
+        </a:xfrm>
+      </p:grpSpPr>
+      <p:sp>
+        <p:nvSpPr>
+          <p:cNvPr id="67" name="TextovéPole 66">
+            <a:extLst>
+              <a:ext uri="{FF2B5EF4-FFF2-40B4-BE49-F238E27FC236}">
+                <a16:creationId xmlns:a16="http://schemas.microsoft.com/office/drawing/2014/main" id="{790E9695-3072-4826-A0DB-A17C89B84B64}"/>
+              </a:ext>
+            </a:extLst>
+          </p:cNvPr>
+          <p:cNvSpPr txBox="1"/>
+          <p:nvPr/>
+        </p:nvSpPr>
+        <p:spPr>
+          <a:xfrm>
+            <a:off x="2124896" y="278680"/>
+            <a:ext cx="6896235" cy="984885"/>
+          </a:xfrm>
+          <a:prstGeom prst="rect">
+            <a:avLst/>
+          </a:prstGeom>
+          <a:noFill/>
+        </p:spPr>
+        <p:txBody>
+          <a:bodyPr wrap="square" rtlCol="0">
+            <a:spAutoFit/>
+          </a:bodyPr>
+          <a:lstStyle/>
+          <a:p>
+            <a:r>
+              <a:rPr lang="en-US" sz="1400" dirty="0"/>
+              <a:t>Stiffness analysis of tensegrity based joints compared to traditional ones</a:t>
+            </a:r>
+            <a:r>
+              <a:rPr lang="cs-CZ" sz="1400" dirty="0"/>
+              <a:t>					GVÚ, 16. 11. 2023</a:t>
+            </a:r>
+            <a:endParaRPr lang="en-US" sz="1400" dirty="0"/>
+          </a:p>
+          <a:p>
+            <a:pPr>
+              <a:spcBef>
+                <a:spcPts val="1200"/>
+              </a:spcBef>
+            </a:pPr>
+            <a:r>
+              <a:rPr lang="cs-CZ" sz="2000" b="1" dirty="0"/>
+              <a:t>Aktuální stav práce</a:t>
+            </a:r>
+          </a:p>
+        </p:txBody>
+      </p:sp>
+      <p:sp>
+        <p:nvSpPr>
+          <p:cNvPr id="81" name="Rectangle 8">
+            <a:extLst>
+              <a:ext uri="{FF2B5EF4-FFF2-40B4-BE49-F238E27FC236}">
+                <a16:creationId xmlns:a16="http://schemas.microsoft.com/office/drawing/2014/main" id="{B5054C40-1026-4F97-B838-23F9FA9E90C0}"/>
+              </a:ext>
+            </a:extLst>
+          </p:cNvPr>
+          <p:cNvSpPr>
+            <a:spLocks noChangeArrowheads="1"/>
+          </p:cNvSpPr>
+          <p:nvPr/>
+        </p:nvSpPr>
+        <p:spPr bwMode="auto">
+          <a:xfrm>
+            <a:off x="2" y="-202588"/>
+            <a:ext cx="184731" cy="405176"/>
+          </a:xfrm>
+          <a:prstGeom prst="rect">
+            <a:avLst/>
+          </a:prstGeom>
+          <a:noFill/>
+          <a:ln>
+            <a:noFill/>
+          </a:ln>
+          <a:effectLst/>
+          <a:extLst>
+            <a:ext uri="{909E8E84-426E-40DD-AFC4-6F175D3DCCD1}">
+              <a14:hiddenFill xmlns:a14="http://schemas.microsoft.com/office/drawing/2010/main">
+                <a:solidFill>
+                  <a:schemeClr val="accent1"/>
+                </a:solidFill>
+              </a14:hiddenFill>
+            </a:ext>
+            <a:ext uri="{91240B29-F687-4F45-9708-019B960494DF}">
+              <a14:hiddenLine xmlns:a14="http://schemas.microsoft.com/office/drawing/2010/main" w="9525">
+                <a:solidFill>
+                  <a:schemeClr val="tx1"/>
+                </a:solidFill>
+                <a:miter lim="800000"/>
+                <a:headEnd/>
+                <a:tailEnd/>
+              </a14:hiddenLine>
+            </a:ext>
+            <a:ext uri="{AF507438-7753-43E0-B8FC-AC1667EBCBE1}">
+              <a14:hiddenEffects xmlns:a14="http://schemas.microsoft.com/office/drawing/2010/main">
+                <a:effectLst>
+                  <a:outerShdw dist="35921" dir="2700000" algn="ctr" rotWithShape="0">
+                    <a:schemeClr val="bg2"/>
+                  </a:outerShdw>
+                </a:effectLst>
+              </a14:hiddenEffects>
+            </a:ext>
+          </a:extLst>
+        </p:spPr>
+        <p:txBody>
+          <a:bodyPr vert="horz" wrap="none" lIns="91440" tIns="45720" rIns="91440" bIns="45720" numCol="1" anchor="ctr" anchorCtr="0" compatLnSpc="1">
+            <a:prstTxWarp prst="textNoShape">
+              <a:avLst/>
+            </a:prstTxWarp>
+            <a:spAutoFit/>
+          </a:bodyPr>
+          <a:lstStyle/>
+          <a:p>
+            <a:endParaRPr lang="cs-CZ" sz="2033"/>
+          </a:p>
+        </p:txBody>
+      </p:sp>
+      <p:pic>
+        <p:nvPicPr>
+          <p:cNvPr id="6" name="Obrázek 5">
+            <a:extLst>
+              <a:ext uri="{FF2B5EF4-FFF2-40B4-BE49-F238E27FC236}">
+                <a16:creationId xmlns:a16="http://schemas.microsoft.com/office/drawing/2014/main" id="{76A9D97B-FC9A-4E43-8006-C2544100DC93}"/>
+              </a:ext>
+            </a:extLst>
+          </p:cNvPr>
+          <p:cNvPicPr>
+            <a:picLocks noChangeAspect="1"/>
+          </p:cNvPicPr>
+          <p:nvPr/>
+        </p:nvPicPr>
+        <p:blipFill>
+          <a:blip r:embed="rId2" cstate="print">
+            <a:extLst>
+              <a:ext uri="{28A0092B-C50C-407E-A947-70E740481C1C}">
+                <a14:useLocalDpi xmlns:a14="http://schemas.microsoft.com/office/drawing/2010/main" val="0"/>
+              </a:ext>
+            </a:extLst>
+          </a:blip>
+          <a:stretch>
+            <a:fillRect/>
+          </a:stretch>
+        </p:blipFill>
+        <p:spPr>
+          <a:xfrm>
+            <a:off x="381740" y="1429305"/>
+            <a:ext cx="2894120" cy="2170590"/>
+          </a:xfrm>
+          <a:prstGeom prst="rect">
+            <a:avLst/>
+          </a:prstGeom>
+        </p:spPr>
+      </p:pic>
+      <p:pic>
+        <p:nvPicPr>
+          <p:cNvPr id="3" name="Obrázek 2">
+            <a:extLst>
+              <a:ext uri="{FF2B5EF4-FFF2-40B4-BE49-F238E27FC236}">
+                <a16:creationId xmlns:a16="http://schemas.microsoft.com/office/drawing/2014/main" id="{A2D5A81D-AD12-4090-A9DE-C1D1CB7FA0F1}"/>
+              </a:ext>
+            </a:extLst>
+          </p:cNvPr>
+          <p:cNvPicPr>
+            <a:picLocks noChangeAspect="1"/>
+          </p:cNvPicPr>
+          <p:nvPr/>
+        </p:nvPicPr>
+        <p:blipFill>
+          <a:blip r:embed="rId3" cstate="print">
+            <a:extLst>
+              <a:ext uri="{28A0092B-C50C-407E-A947-70E740481C1C}">
+                <a14:useLocalDpi xmlns:a14="http://schemas.microsoft.com/office/drawing/2010/main" val="0"/>
+              </a:ext>
+            </a:extLst>
+          </a:blip>
+          <a:stretch>
+            <a:fillRect/>
+          </a:stretch>
+        </p:blipFill>
+        <p:spPr>
+          <a:xfrm>
+            <a:off x="381740" y="3783390"/>
+            <a:ext cx="2260477" cy="3013969"/>
+          </a:xfrm>
+          <a:prstGeom prst="rect">
+            <a:avLst/>
+          </a:prstGeom>
+        </p:spPr>
+      </p:pic>
+      <p:pic>
+        <p:nvPicPr>
+          <p:cNvPr id="5" name="Obrázek 4">
+            <a:extLst>
+              <a:ext uri="{FF2B5EF4-FFF2-40B4-BE49-F238E27FC236}">
+                <a16:creationId xmlns:a16="http://schemas.microsoft.com/office/drawing/2014/main" id="{162D7935-5EE8-46AC-99BC-4241BB2FE92C}"/>
+              </a:ext>
+            </a:extLst>
+          </p:cNvPr>
+          <p:cNvPicPr>
+            <a:picLocks noChangeAspect="1"/>
+          </p:cNvPicPr>
+          <p:nvPr/>
+        </p:nvPicPr>
+        <p:blipFill>
+          <a:blip r:embed="rId4" cstate="print">
+            <a:extLst>
+              <a:ext uri="{28A0092B-C50C-407E-A947-70E740481C1C}">
+                <a14:useLocalDpi xmlns:a14="http://schemas.microsoft.com/office/drawing/2010/main" val="0"/>
+              </a:ext>
+            </a:extLst>
+          </a:blip>
+          <a:stretch>
+            <a:fillRect/>
+          </a:stretch>
+        </p:blipFill>
+        <p:spPr>
+          <a:xfrm>
+            <a:off x="3275860" y="1429305"/>
+            <a:ext cx="2894121" cy="2170591"/>
+          </a:xfrm>
+          <a:prstGeom prst="rect">
+            <a:avLst/>
+          </a:prstGeom>
+        </p:spPr>
+      </p:pic>
+      <p:pic>
+        <p:nvPicPr>
+          <p:cNvPr id="8" name="Obrázek 7">
+            <a:extLst>
+              <a:ext uri="{FF2B5EF4-FFF2-40B4-BE49-F238E27FC236}">
+                <a16:creationId xmlns:a16="http://schemas.microsoft.com/office/drawing/2014/main" id="{41E65BEB-87DE-4D6F-8B36-70F469C9B6E0}"/>
+              </a:ext>
+            </a:extLst>
+          </p:cNvPr>
+          <p:cNvPicPr>
+            <a:picLocks noChangeAspect="1"/>
+          </p:cNvPicPr>
+          <p:nvPr/>
+        </p:nvPicPr>
+        <p:blipFill>
+          <a:blip r:embed="rId5" cstate="print">
+            <a:extLst>
+              <a:ext uri="{28A0092B-C50C-407E-A947-70E740481C1C}">
+                <a14:useLocalDpi xmlns:a14="http://schemas.microsoft.com/office/drawing/2010/main" val="0"/>
+              </a:ext>
+            </a:extLst>
+          </a:blip>
+          <a:stretch>
+            <a:fillRect/>
+          </a:stretch>
+        </p:blipFill>
+        <p:spPr>
+          <a:xfrm>
+            <a:off x="6059240" y="1429305"/>
+            <a:ext cx="2894120" cy="2170590"/>
+          </a:xfrm>
+          <a:prstGeom prst="rect">
+            <a:avLst/>
+          </a:prstGeom>
+        </p:spPr>
+      </p:pic>
+      <p:pic>
+        <p:nvPicPr>
+          <p:cNvPr id="10" name="Obrázek 9">
+            <a:extLst>
+              <a:ext uri="{FF2B5EF4-FFF2-40B4-BE49-F238E27FC236}">
+                <a16:creationId xmlns:a16="http://schemas.microsoft.com/office/drawing/2014/main" id="{CB4AE4EF-86BF-4E3F-9D66-14B1D36A5A49}"/>
+              </a:ext>
+            </a:extLst>
+          </p:cNvPr>
+          <p:cNvPicPr>
+            <a:picLocks noChangeAspect="1"/>
+          </p:cNvPicPr>
+          <p:nvPr/>
+        </p:nvPicPr>
+        <p:blipFill>
+          <a:blip r:embed="rId6">
+            <a:extLst>
+              <a:ext uri="{28A0092B-C50C-407E-A947-70E740481C1C}">
+                <a14:useLocalDpi xmlns:a14="http://schemas.microsoft.com/office/drawing/2010/main" val="0"/>
+              </a:ext>
+            </a:extLst>
+          </a:blip>
+          <a:stretch>
+            <a:fillRect/>
+          </a:stretch>
+        </p:blipFill>
+        <p:spPr>
+          <a:xfrm>
+            <a:off x="3690566" y="3599895"/>
+            <a:ext cx="4034670" cy="3026002"/>
+          </a:xfrm>
+          <a:prstGeom prst="rect">
+            <a:avLst/>
+          </a:prstGeom>
+        </p:spPr>
+      </p:pic>
+      <p:pic>
+        <p:nvPicPr>
+          <p:cNvPr id="12" name="Obrázek 11">
+            <a:extLst>
+              <a:ext uri="{FF2B5EF4-FFF2-40B4-BE49-F238E27FC236}">
+                <a16:creationId xmlns:a16="http://schemas.microsoft.com/office/drawing/2014/main" id="{8AEE008F-6C97-47F9-8267-DBCA37064C49}"/>
+              </a:ext>
+            </a:extLst>
+          </p:cNvPr>
+          <p:cNvPicPr>
+            <a:picLocks noChangeAspect="1"/>
+          </p:cNvPicPr>
+          <p:nvPr/>
+        </p:nvPicPr>
+        <p:blipFill>
+          <a:blip r:embed="rId7" cstate="print">
+            <a:extLst>
+              <a:ext uri="{28A0092B-C50C-407E-A947-70E740481C1C}">
+                <a14:useLocalDpi xmlns:a14="http://schemas.microsoft.com/office/drawing/2010/main" val="0"/>
+              </a:ext>
+            </a:extLst>
+          </a:blip>
+          <a:stretch>
+            <a:fillRect/>
+          </a:stretch>
+        </p:blipFill>
+        <p:spPr>
+          <a:xfrm>
+            <a:off x="7506300" y="5428695"/>
+            <a:ext cx="1361072" cy="1020804"/>
+          </a:xfrm>
+          <a:prstGeom prst="rect">
+            <a:avLst/>
+          </a:prstGeom>
+        </p:spPr>
+      </p:pic>
+      <p:pic>
+        <p:nvPicPr>
+          <p:cNvPr id="14" name="Obrázek 13">
+            <a:extLst>
+              <a:ext uri="{FF2B5EF4-FFF2-40B4-BE49-F238E27FC236}">
+                <a16:creationId xmlns:a16="http://schemas.microsoft.com/office/drawing/2014/main" id="{1C1A6B61-A808-4B46-9934-CDD621503426}"/>
+              </a:ext>
+            </a:extLst>
+          </p:cNvPr>
+          <p:cNvPicPr>
+            <a:picLocks noChangeAspect="1"/>
+          </p:cNvPicPr>
+          <p:nvPr/>
+        </p:nvPicPr>
+        <p:blipFill>
+          <a:blip r:embed="rId8" cstate="print">
+            <a:extLst>
+              <a:ext uri="{28A0092B-C50C-407E-A947-70E740481C1C}">
+                <a14:useLocalDpi xmlns:a14="http://schemas.microsoft.com/office/drawing/2010/main" val="0"/>
+              </a:ext>
+            </a:extLst>
+          </a:blip>
+          <a:stretch>
+            <a:fillRect/>
+          </a:stretch>
+        </p:blipFill>
+        <p:spPr>
+          <a:xfrm>
+            <a:off x="7334444" y="3783390"/>
+            <a:ext cx="1427816" cy="1070862"/>
+          </a:xfrm>
+          <a:prstGeom prst="rect">
+            <a:avLst/>
+          </a:prstGeom>
+        </p:spPr>
+      </p:pic>
+      <p:pic>
+        <p:nvPicPr>
+          <p:cNvPr id="4" name="Obrázek 3">
+            <a:extLst>
+              <a:ext uri="{FF2B5EF4-FFF2-40B4-BE49-F238E27FC236}">
+                <a16:creationId xmlns:a16="http://schemas.microsoft.com/office/drawing/2014/main" id="{CA43204A-EDFE-463C-82BE-5FFF27D9316E}"/>
+              </a:ext>
+            </a:extLst>
+          </p:cNvPr>
+          <p:cNvPicPr>
+            <a:picLocks noChangeAspect="1"/>
+          </p:cNvPicPr>
+          <p:nvPr/>
+        </p:nvPicPr>
+        <p:blipFill>
+          <a:blip r:embed="rId9" cstate="print">
+            <a:extLst>
+              <a:ext uri="{28A0092B-C50C-407E-A947-70E740481C1C}">
+                <a14:useLocalDpi xmlns:a14="http://schemas.microsoft.com/office/drawing/2010/main" val="0"/>
+              </a:ext>
+            </a:extLst>
+          </a:blip>
+          <a:stretch>
+            <a:fillRect/>
+          </a:stretch>
+        </p:blipFill>
+        <p:spPr>
+          <a:xfrm>
+            <a:off x="2168601" y="3483843"/>
+            <a:ext cx="2443579" cy="3258105"/>
+          </a:xfrm>
+          <a:prstGeom prst="rect">
+            <a:avLst/>
+          </a:prstGeom>
+        </p:spPr>
+      </p:pic>
+    </p:spTree>
+    <p:extLst>
+      <p:ext uri="{BB962C8B-B14F-4D97-AF65-F5344CB8AC3E}">
+        <p14:creationId xmlns:p14="http://schemas.microsoft.com/office/powerpoint/2010/main" val="1304273827"/>
+      </p:ext>
+    </p:extLst>
+  </p:cSld>
+  <p:clrMapOvr>
+    <a:masterClrMapping/>
+  </p:clrMapOvr>
+</p:sld>
+</file>
+
+<file path=ppt/slides/slide5.xml><?xml version="1.0" encoding="utf-8"?>
 <p:sld xmlns:a="http://schemas.openxmlformats.org/drawingml/2006/main" xmlns:r="http://schemas.openxmlformats.org/officeDocument/2006/relationships" xmlns:p="http://schemas.openxmlformats.org/presentationml/2006/main">
   <p:cSld>
     <p:spTree>
@@ -2874,18 +3479,18 @@
 </file>
 
 <file path=customXml/item2.xml><?xml version="1.0" encoding="utf-8"?>
-<p:properties xmlns:p="http://schemas.microsoft.com/office/2006/metadata/properties" xmlns:xsi="http://www.w3.org/2001/XMLSchema-instance" xmlns:pc="http://schemas.microsoft.com/office/infopath/2007/PartnerControls">
-  <documentManagement/>
-</p:properties>
-</file>
-
-<file path=customXml/item3.xml><?xml version="1.0" encoding="utf-8"?>
 <?mso-contentType ?>
 <FormTemplates xmlns="http://schemas.microsoft.com/sharepoint/v3/contenttype/forms">
   <Display>DocumentLibraryForm</Display>
   <Edit>DocumentLibraryForm</Edit>
   <New>DocumentLibraryForm</New>
 </FormTemplates>
+</file>
+
+<file path=customXml/item3.xml><?xml version="1.0" encoding="utf-8"?>
+<p:properties xmlns:p="http://schemas.microsoft.com/office/2006/metadata/properties" xmlns:xsi="http://www.w3.org/2001/XMLSchema-instance" xmlns:pc="http://schemas.microsoft.com/office/infopath/2007/PartnerControls">
+  <documentManagement/>
+</p:properties>
 </file>
 
 <file path=customXml/itemProps1.xml><?xml version="1.0" encoding="utf-8"?>
@@ -2908,6 +3513,14 @@
 </file>
 
 <file path=customXml/itemProps2.xml><?xml version="1.0" encoding="utf-8"?>
+<ds:datastoreItem xmlns:ds="http://schemas.openxmlformats.org/officeDocument/2006/customXml" ds:itemID="{A7B5F9C6-7A2B-455D-8800-65C9569D5346}">
+  <ds:schemaRefs>
+    <ds:schemaRef ds:uri="http://schemas.microsoft.com/sharepoint/v3/contenttype/forms"/>
+  </ds:schemaRefs>
+</ds:datastoreItem>
+</file>
+
+<file path=customXml/itemProps3.xml><?xml version="1.0" encoding="utf-8"?>
 <ds:datastoreItem xmlns:ds="http://schemas.openxmlformats.org/officeDocument/2006/customXml" ds:itemID="{3450981B-49CA-4098-A3BE-3EF98F7F4081}">
   <ds:schemaRefs>
     <ds:schemaRef ds:uri="http://purl.org/dc/elements/1.1/"/>
@@ -2922,12 +3535,4 @@
     <ds:schemaRef ds:uri="http://purl.org/dc/dcmitype/"/>
   </ds:schemaRefs>
 </ds:datastoreItem>
-</file>
-
-<file path=customXml/itemProps3.xml><?xml version="1.0" encoding="utf-8"?>
-<ds:datastoreItem xmlns:ds="http://schemas.openxmlformats.org/officeDocument/2006/customXml" ds:itemID="{A7B5F9C6-7A2B-455D-8800-65C9569D5346}">
-  <ds:schemaRefs>
-    <ds:schemaRef ds:uri="http://schemas.microsoft.com/sharepoint/v3/contenttype/forms"/>
-  </ds:schemaRefs>
-</ds:datastoreItem>
 </file>
</xml_diff>